<commit_message>
fin regresion log tipos, tambien presentacion
</commit_message>
<xml_diff>
--- a/Proyecto_Final/Aprendizaje Automático.pptx
+++ b/Proyecto_Final/Aprendizaje Automático.pptx
@@ -116,6 +116,11 @@
       </a:defRPr>
     </a:lvl9pPr>
   </p:defaultTextStyle>
+  <p:extLst>
+    <p:ext uri="{EFAFB233-063F-42B5-8137-9DF3F51BA10A}">
+      <p15:sldGuideLst xmlns:p15="http://schemas.microsoft.com/office/powerpoint/2012/main"/>
+    </p:ext>
+  </p:extLst>
 </p:presentation>
 </file>
 
@@ -268,7 +273,7 @@
           <a:p>
             <a:fld id="{4EB0922A-B9F7-43AB-8431-B5BE408EEF3A}" type="datetimeFigureOut">
               <a:rPr lang="en-GB" smtClean="0"/>
-              <a:t>24/01/2020</a:t>
+              <a:t>27/01/2020</a:t>
             </a:fld>
             <a:endParaRPr lang="en-GB"/>
           </a:p>
@@ -468,7 +473,7 @@
           <a:p>
             <a:fld id="{4EB0922A-B9F7-43AB-8431-B5BE408EEF3A}" type="datetimeFigureOut">
               <a:rPr lang="en-GB" smtClean="0"/>
-              <a:t>24/01/2020</a:t>
+              <a:t>27/01/2020</a:t>
             </a:fld>
             <a:endParaRPr lang="en-GB"/>
           </a:p>
@@ -678,7 +683,7 @@
           <a:p>
             <a:fld id="{4EB0922A-B9F7-43AB-8431-B5BE408EEF3A}" type="datetimeFigureOut">
               <a:rPr lang="en-GB" smtClean="0"/>
-              <a:t>24/01/2020</a:t>
+              <a:t>27/01/2020</a:t>
             </a:fld>
             <a:endParaRPr lang="en-GB"/>
           </a:p>
@@ -878,7 +883,7 @@
           <a:p>
             <a:fld id="{4EB0922A-B9F7-43AB-8431-B5BE408EEF3A}" type="datetimeFigureOut">
               <a:rPr lang="en-GB" smtClean="0"/>
-              <a:t>24/01/2020</a:t>
+              <a:t>27/01/2020</a:t>
             </a:fld>
             <a:endParaRPr lang="en-GB"/>
           </a:p>
@@ -1154,7 +1159,7 @@
           <a:p>
             <a:fld id="{4EB0922A-B9F7-43AB-8431-B5BE408EEF3A}" type="datetimeFigureOut">
               <a:rPr lang="en-GB" smtClean="0"/>
-              <a:t>24/01/2020</a:t>
+              <a:t>27/01/2020</a:t>
             </a:fld>
             <a:endParaRPr lang="en-GB"/>
           </a:p>
@@ -1422,7 +1427,7 @@
           <a:p>
             <a:fld id="{4EB0922A-B9F7-43AB-8431-B5BE408EEF3A}" type="datetimeFigureOut">
               <a:rPr lang="en-GB" smtClean="0"/>
-              <a:t>24/01/2020</a:t>
+              <a:t>27/01/2020</a:t>
             </a:fld>
             <a:endParaRPr lang="en-GB"/>
           </a:p>
@@ -1837,7 +1842,7 @@
           <a:p>
             <a:fld id="{4EB0922A-B9F7-43AB-8431-B5BE408EEF3A}" type="datetimeFigureOut">
               <a:rPr lang="en-GB" smtClean="0"/>
-              <a:t>24/01/2020</a:t>
+              <a:t>27/01/2020</a:t>
             </a:fld>
             <a:endParaRPr lang="en-GB"/>
           </a:p>
@@ -1979,7 +1984,7 @@
           <a:p>
             <a:fld id="{4EB0922A-B9F7-43AB-8431-B5BE408EEF3A}" type="datetimeFigureOut">
               <a:rPr lang="en-GB" smtClean="0"/>
-              <a:t>24/01/2020</a:t>
+              <a:t>27/01/2020</a:t>
             </a:fld>
             <a:endParaRPr lang="en-GB"/>
           </a:p>
@@ -2092,7 +2097,7 @@
           <a:p>
             <a:fld id="{4EB0922A-B9F7-43AB-8431-B5BE408EEF3A}" type="datetimeFigureOut">
               <a:rPr lang="en-GB" smtClean="0"/>
-              <a:t>24/01/2020</a:t>
+              <a:t>27/01/2020</a:t>
             </a:fld>
             <a:endParaRPr lang="en-GB"/>
           </a:p>
@@ -2405,7 +2410,7 @@
           <a:p>
             <a:fld id="{4EB0922A-B9F7-43AB-8431-B5BE408EEF3A}" type="datetimeFigureOut">
               <a:rPr lang="en-GB" smtClean="0"/>
-              <a:t>24/01/2020</a:t>
+              <a:t>27/01/2020</a:t>
             </a:fld>
             <a:endParaRPr lang="en-GB"/>
           </a:p>
@@ -2694,7 +2699,7 @@
           <a:p>
             <a:fld id="{4EB0922A-B9F7-43AB-8431-B5BE408EEF3A}" type="datetimeFigureOut">
               <a:rPr lang="en-GB" smtClean="0"/>
-              <a:t>24/01/2020</a:t>
+              <a:t>27/01/2020</a:t>
             </a:fld>
             <a:endParaRPr lang="en-GB"/>
           </a:p>
@@ -2937,7 +2942,7 @@
           <a:p>
             <a:fld id="{4EB0922A-B9F7-43AB-8431-B5BE408EEF3A}" type="datetimeFigureOut">
               <a:rPr lang="en-GB" smtClean="0"/>
-              <a:t>24/01/2020</a:t>
+              <a:t>27/01/2020</a:t>
             </a:fld>
             <a:endParaRPr lang="en-GB"/>
           </a:p>
@@ -4147,13 +4152,13 @@
   <p:clrMapOvr>
     <a:masterClrMapping/>
   </p:clrMapOvr>
-  <mc:AlternateContent xmlns:mc="http://schemas.openxmlformats.org/markup-compatibility/2006">
-    <mc:Choice xmlns:p14="http://schemas.microsoft.com/office/powerpoint/2010/main" Requires="p14">
+  <mc:AlternateContent xmlns:mc="http://schemas.openxmlformats.org/markup-compatibility/2006" xmlns:p14="http://schemas.microsoft.com/office/powerpoint/2010/main">
+    <mc:Choice Requires="p14">
       <p:transition spd="med" p14:dur="700">
         <p:fade/>
       </p:transition>
     </mc:Choice>
-    <mc:Fallback>
+    <mc:Fallback xmlns="">
       <p:transition spd="med">
         <p:fade/>
       </p:transition>
@@ -4482,13 +4487,13 @@
   <p:clrMapOvr>
     <a:masterClrMapping/>
   </p:clrMapOvr>
-  <mc:AlternateContent xmlns:mc="http://schemas.openxmlformats.org/markup-compatibility/2006">
-    <mc:Choice xmlns:p14="http://schemas.microsoft.com/office/powerpoint/2010/main" Requires="p14">
+  <mc:AlternateContent xmlns:mc="http://schemas.openxmlformats.org/markup-compatibility/2006" xmlns:p14="http://schemas.microsoft.com/office/powerpoint/2010/main">
+    <mc:Choice Requires="p14">
       <p:transition spd="med" p14:dur="700">
         <p:fade/>
       </p:transition>
     </mc:Choice>
-    <mc:Fallback>
+    <mc:Fallback xmlns="">
       <p:transition spd="med">
         <p:fade/>
       </p:transition>
@@ -5096,13 +5101,13 @@
   <p:clrMapOvr>
     <a:masterClrMapping/>
   </p:clrMapOvr>
-  <mc:AlternateContent xmlns:mc="http://schemas.openxmlformats.org/markup-compatibility/2006">
-    <mc:Choice xmlns:p14="http://schemas.microsoft.com/office/powerpoint/2010/main" Requires="p14">
+  <mc:AlternateContent xmlns:mc="http://schemas.openxmlformats.org/markup-compatibility/2006" xmlns:p14="http://schemas.microsoft.com/office/powerpoint/2010/main">
+    <mc:Choice Requires="p14">
       <p:transition spd="med" p14:dur="700">
         <p:fade/>
       </p:transition>
     </mc:Choice>
-    <mc:Fallback>
+    <mc:Fallback xmlns="">
       <p:transition spd="med">
         <p:fade/>
       </p:transition>
@@ -5714,13 +5719,13 @@
   <p:clrMapOvr>
     <a:masterClrMapping/>
   </p:clrMapOvr>
-  <mc:AlternateContent xmlns:mc="http://schemas.openxmlformats.org/markup-compatibility/2006">
-    <mc:Choice xmlns:p14="http://schemas.microsoft.com/office/powerpoint/2010/main" Requires="p14">
+  <mc:AlternateContent xmlns:mc="http://schemas.openxmlformats.org/markup-compatibility/2006" xmlns:p14="http://schemas.microsoft.com/office/powerpoint/2010/main">
+    <mc:Choice Requires="p14">
       <p:transition spd="med" p14:dur="700">
         <p:fade/>
       </p:transition>
     </mc:Choice>
-    <mc:Fallback>
+    <mc:Fallback xmlns="">
       <p:transition spd="med">
         <p:fade/>
       </p:transition>
@@ -6908,13 +6913,13 @@
   <p:clrMapOvr>
     <a:masterClrMapping/>
   </p:clrMapOvr>
-  <mc:AlternateContent xmlns:mc="http://schemas.openxmlformats.org/markup-compatibility/2006">
-    <mc:Choice xmlns:p14="http://schemas.microsoft.com/office/powerpoint/2010/main" Requires="p14">
+  <mc:AlternateContent xmlns:mc="http://schemas.openxmlformats.org/markup-compatibility/2006" xmlns:p14="http://schemas.microsoft.com/office/powerpoint/2010/main">
+    <mc:Choice Requires="p14">
       <p:transition spd="med" p14:dur="700">
         <p:fade/>
       </p:transition>
     </mc:Choice>
-    <mc:Fallback>
+    <mc:Fallback xmlns="">
       <p:transition spd="med">
         <p:fade/>
       </p:transition>
@@ -7848,13 +7853,13 @@
   <p:clrMapOvr>
     <a:masterClrMapping/>
   </p:clrMapOvr>
-  <mc:AlternateContent xmlns:mc="http://schemas.openxmlformats.org/markup-compatibility/2006">
-    <mc:Choice xmlns:p14="http://schemas.microsoft.com/office/powerpoint/2010/main" Requires="p14">
+  <mc:AlternateContent xmlns:mc="http://schemas.openxmlformats.org/markup-compatibility/2006" xmlns:p14="http://schemas.microsoft.com/office/powerpoint/2010/main">
+    <mc:Choice Requires="p14">
       <p:transition spd="med" p14:dur="700">
         <p:fade/>
       </p:transition>
     </mc:Choice>
-    <mc:Fallback>
+    <mc:Fallback xmlns="">
       <p:transition spd="med">
         <p:fade/>
       </p:transition>
@@ -8076,13 +8081,13 @@
   <p:clrMapOvr>
     <a:masterClrMapping/>
   </p:clrMapOvr>
-  <mc:AlternateContent xmlns:mc="http://schemas.openxmlformats.org/markup-compatibility/2006">
-    <mc:Choice xmlns:p14="http://schemas.microsoft.com/office/powerpoint/2010/main" Requires="p14">
+  <mc:AlternateContent xmlns:mc="http://schemas.openxmlformats.org/markup-compatibility/2006" xmlns:p14="http://schemas.microsoft.com/office/powerpoint/2010/main">
+    <mc:Choice Requires="p14">
       <p:transition spd="med" p14:dur="700">
         <p:fade/>
       </p:transition>
     </mc:Choice>
-    <mc:Fallback>
+    <mc:Fallback xmlns="">
       <p:transition spd="med">
         <p:fade/>
       </p:transition>
@@ -8323,13 +8328,13 @@
   <p:clrMapOvr>
     <a:masterClrMapping/>
   </p:clrMapOvr>
-  <mc:AlternateContent xmlns:mc="http://schemas.openxmlformats.org/markup-compatibility/2006">
-    <mc:Choice xmlns:p14="http://schemas.microsoft.com/office/powerpoint/2010/main" Requires="p14">
+  <mc:AlternateContent xmlns:mc="http://schemas.openxmlformats.org/markup-compatibility/2006" xmlns:p14="http://schemas.microsoft.com/office/powerpoint/2010/main">
+    <mc:Choice Requires="p14">
       <p:transition spd="med" p14:dur="700">
         <p:fade/>
       </p:transition>
     </mc:Choice>
-    <mc:Fallback>
+    <mc:Fallback xmlns="">
       <p:transition spd="med">
         <p:fade/>
       </p:transition>
@@ -8576,13 +8581,13 @@
   <p:clrMapOvr>
     <a:masterClrMapping/>
   </p:clrMapOvr>
-  <mc:AlternateContent xmlns:mc="http://schemas.openxmlformats.org/markup-compatibility/2006">
-    <mc:Choice xmlns:p14="http://schemas.microsoft.com/office/powerpoint/2010/main" Requires="p14">
+  <mc:AlternateContent xmlns:mc="http://schemas.openxmlformats.org/markup-compatibility/2006" xmlns:p14="http://schemas.microsoft.com/office/powerpoint/2010/main">
+    <mc:Choice Requires="p14">
       <p:transition spd="med" p14:dur="700">
         <p:fade/>
       </p:transition>
     </mc:Choice>
-    <mc:Fallback>
+    <mc:Fallback xmlns="">
       <p:transition spd="med">
         <p:fade/>
       </p:transition>
@@ -9003,13 +9008,13 @@
   <p:clrMapOvr>
     <a:masterClrMapping/>
   </p:clrMapOvr>
-  <mc:AlternateContent xmlns:mc="http://schemas.openxmlformats.org/markup-compatibility/2006">
-    <mc:Choice xmlns:p14="http://schemas.microsoft.com/office/powerpoint/2010/main" Requires="p14">
+  <mc:AlternateContent xmlns:mc="http://schemas.openxmlformats.org/markup-compatibility/2006" xmlns:p14="http://schemas.microsoft.com/office/powerpoint/2010/main">
+    <mc:Choice Requires="p14">
       <p:transition spd="med" p14:dur="700">
         <p:fade/>
       </p:transition>
     </mc:Choice>
-    <mc:Fallback>
+    <mc:Fallback xmlns="">
       <p:transition spd="med">
         <p:fade/>
       </p:transition>
@@ -9226,13 +9231,13 @@
   <p:clrMapOvr>
     <a:masterClrMapping/>
   </p:clrMapOvr>
-  <mc:AlternateContent xmlns:mc="http://schemas.openxmlformats.org/markup-compatibility/2006">
-    <mc:Choice xmlns:p14="http://schemas.microsoft.com/office/powerpoint/2010/main" Requires="p14">
+  <mc:AlternateContent xmlns:mc="http://schemas.openxmlformats.org/markup-compatibility/2006" xmlns:p14="http://schemas.microsoft.com/office/powerpoint/2010/main">
+    <mc:Choice Requires="p14">
       <p:transition spd="med" p14:dur="700">
         <p:fade/>
       </p:transition>
     </mc:Choice>
-    <mc:Fallback>
+    <mc:Fallback xmlns="">
       <p:transition spd="med">
         <p:fade/>
       </p:transition>
@@ -9397,6 +9402,36 @@
           </a:p>
         </p:txBody>
       </p:sp>
+      <p:pic>
+        <p:nvPicPr>
+          <p:cNvPr id="3" name="Picture 2">
+            <a:extLst>
+              <a:ext uri="{FF2B5EF4-FFF2-40B4-BE49-F238E27FC236}">
+                <a16:creationId xmlns:a16="http://schemas.microsoft.com/office/drawing/2014/main" id="{9E908658-5248-404E-A6B4-CF9E4F635AF5}"/>
+              </a:ext>
+            </a:extLst>
+          </p:cNvPr>
+          <p:cNvPicPr>
+            <a:picLocks noChangeAspect="1"/>
+          </p:cNvPicPr>
+          <p:nvPr/>
+        </p:nvPicPr>
+        <p:blipFill>
+          <a:blip r:embed="rId3"/>
+          <a:stretch>
+            <a:fillRect/>
+          </a:stretch>
+        </p:blipFill>
+        <p:spPr>
+          <a:xfrm>
+            <a:off x="6223003" y="2098583"/>
+            <a:ext cx="5130797" cy="3508649"/>
+          </a:xfrm>
+          <a:prstGeom prst="rect">
+            <a:avLst/>
+          </a:prstGeom>
+        </p:spPr>
+      </p:pic>
     </p:spTree>
     <p:extLst>
       <p:ext uri="{BB962C8B-B14F-4D97-AF65-F5344CB8AC3E}">
@@ -9407,13 +9442,13 @@
   <p:clrMapOvr>
     <a:masterClrMapping/>
   </p:clrMapOvr>
-  <mc:AlternateContent xmlns:mc="http://schemas.openxmlformats.org/markup-compatibility/2006">
-    <mc:Choice xmlns:p14="http://schemas.microsoft.com/office/powerpoint/2010/main" Requires="p14">
+  <mc:AlternateContent xmlns:mc="http://schemas.openxmlformats.org/markup-compatibility/2006" xmlns:p14="http://schemas.microsoft.com/office/powerpoint/2010/main">
+    <mc:Choice Requires="p14">
       <p:transition spd="med" p14:dur="700">
         <p:fade/>
       </p:transition>
     </mc:Choice>
-    <mc:Fallback>
+    <mc:Fallback xmlns="">
       <p:transition spd="med">
         <p:fade/>
       </p:transition>
@@ -9555,7 +9590,7 @@
         </p:nvSpPr>
         <p:spPr>
           <a:xfrm>
-            <a:off x="7792734" y="5672831"/>
+            <a:off x="7262049" y="5514798"/>
             <a:ext cx="2692400" cy="369332"/>
           </a:xfrm>
           <a:prstGeom prst="rect">
@@ -9578,6 +9613,36 @@
           </a:p>
         </p:txBody>
       </p:sp>
+      <p:pic>
+        <p:nvPicPr>
+          <p:cNvPr id="3" name="Picture 2">
+            <a:extLst>
+              <a:ext uri="{FF2B5EF4-FFF2-40B4-BE49-F238E27FC236}">
+                <a16:creationId xmlns:a16="http://schemas.microsoft.com/office/drawing/2014/main" id="{628DD66F-1F81-45FF-8DF4-D345721C3418}"/>
+              </a:ext>
+            </a:extLst>
+          </p:cNvPr>
+          <p:cNvPicPr>
+            <a:picLocks noChangeAspect="1"/>
+          </p:cNvPicPr>
+          <p:nvPr/>
+        </p:nvPicPr>
+        <p:blipFill>
+          <a:blip r:embed="rId3"/>
+          <a:stretch>
+            <a:fillRect/>
+          </a:stretch>
+        </p:blipFill>
+        <p:spPr>
+          <a:xfrm>
+            <a:off x="6231861" y="2175120"/>
+            <a:ext cx="4752777" cy="3355575"/>
+          </a:xfrm>
+          <a:prstGeom prst="rect">
+            <a:avLst/>
+          </a:prstGeom>
+        </p:spPr>
+      </p:pic>
     </p:spTree>
     <p:extLst>
       <p:ext uri="{BB962C8B-B14F-4D97-AF65-F5344CB8AC3E}">
@@ -9588,13 +9653,13 @@
   <p:clrMapOvr>
     <a:masterClrMapping/>
   </p:clrMapOvr>
-  <mc:AlternateContent xmlns:mc="http://schemas.openxmlformats.org/markup-compatibility/2006">
-    <mc:Choice xmlns:p14="http://schemas.microsoft.com/office/powerpoint/2010/main" Requires="p14">
+  <mc:AlternateContent xmlns:mc="http://schemas.openxmlformats.org/markup-compatibility/2006" xmlns:p14="http://schemas.microsoft.com/office/powerpoint/2010/main">
+    <mc:Choice Requires="p14">
       <p:transition spd="med" p14:dur="700">
         <p:fade/>
       </p:transition>
     </mc:Choice>
-    <mc:Fallback>
+    <mc:Fallback xmlns="">
       <p:transition spd="med">
         <p:fade/>
       </p:transition>

</xml_diff>